<commit_message>
Edits in class 4/17
</commit_message>
<xml_diff>
--- a/asikora/basketball/module/SYE_Poster_Sikora_Final-with_comments.pptx
+++ b/asikora/basketball/module/SYE_Poster_Sikora_Final-with_comments.pptx
@@ -141,66 +141,6 @@
 </p:cmAuthorLst>
 </file>
 
-<file path=ppt/comments/comment1.xml><?xml version="1.0" encoding="utf-8"?>
-<p:cmLst xmlns:a="http://schemas.openxmlformats.org/drawingml/2006/main" xmlns:r="http://schemas.openxmlformats.org/officeDocument/2006/relationships" xmlns:p="http://schemas.openxmlformats.org/presentationml/2006/main">
-  <p:cm authorId="1" dt="2025-04-17T08:34:57.694" idx="1">
-    <p:pos x="2045" y="15408"/>
-    <p:text>number 4 doesn't line up with this one</p:text>
-    <p:extLst>
-      <p:ext uri="{C676402C-5697-4E1C-873F-D02D1690AC5C}">
-        <p15:threadingInfo xmlns:p15="http://schemas.microsoft.com/office/powerpoint/2012/main" timeZoneBias="240"/>
-      </p:ext>
-    </p:extLst>
-  </p:cm>
-  <p:cm authorId="1" dt="2025-04-17T08:35:27.321" idx="2">
-    <p:pos x="11318" y="11146"/>
-    <p:text>this bullet doesn't line up with the previous 
-can delete the line break to put it on the same line as the previous bullet, then hit enter to make it a new bullet that should have the same spacing as the others</p:text>
-    <p:extLst>
-      <p:ext uri="{C676402C-5697-4E1C-873F-D02D1690AC5C}">
-        <p15:threadingInfo xmlns:p15="http://schemas.microsoft.com/office/powerpoint/2012/main" timeZoneBias="240"/>
-      </p:ext>
-    </p:extLst>
-  </p:cm>
-  <p:cm authorId="1" dt="2025-04-17T08:36:57.867" idx="3">
-    <p:pos x="16589" y="9878"/>
-    <p:text>might need to delete this to make room for a change in the screenshot below</p:text>
-    <p:extLst>
-      <p:ext uri="{C676402C-5697-4E1C-873F-D02D1690AC5C}">
-        <p15:threadingInfo xmlns:p15="http://schemas.microsoft.com/office/powerpoint/2012/main" timeZoneBias="240"/>
-      </p:ext>
-    </p:extLst>
-  </p:cm>
-  <p:cm authorId="1" dt="2025-04-17T08:37:20.396" idx="4">
-    <p:pos x="16828" y="12098"/>
-    <p:text>the ratios are off in this one as it looks squished. when resizing, you'll want to maintain the same aspect ratios</p:text>
-    <p:extLst>
-      <p:ext uri="{C676402C-5697-4E1C-873F-D02D1690AC5C}">
-        <p15:threadingInfo xmlns:p15="http://schemas.microsoft.com/office/powerpoint/2012/main" timeZoneBias="240"/>
-      </p:ext>
-    </p:extLst>
-  </p:cm>
-  <p:cm authorId="1" dt="2025-04-17T08:38:40.529" idx="5">
-    <p:pos x="16303" y="8452"/>
-    <p:text>have this box be wider to get it on a single</p:text>
-    <p:extLst>
-      <p:ext uri="{C676402C-5697-4E1C-873F-D02D1690AC5C}">
-        <p15:threadingInfo xmlns:p15="http://schemas.microsoft.com/office/powerpoint/2012/main" timeZoneBias="240"/>
-      </p:ext>
-    </p:extLst>
-  </p:cm>
-  <p:cm authorId="1" dt="2025-04-17T08:39:03.134" idx="6">
-    <p:pos x="15696" y="8928"/>
-    <p:text>the header font sizes are not consistent</p:text>
-    <p:extLst>
-      <p:ext uri="{C676402C-5697-4E1C-873F-D02D1690AC5C}">
-        <p15:threadingInfo xmlns:p15="http://schemas.microsoft.com/office/powerpoint/2012/main" timeZoneBias="240"/>
-      </p:ext>
-    </p:extLst>
-  </p:cm>
-</p:cmLst>
-</file>
-
 <file path=ppt/slideLayouts/slideLayout1.xml><?xml version="1.0" encoding="utf-8"?>
 <p:sldLayout xmlns:a="http://schemas.openxmlformats.org/drawingml/2006/main" xmlns:r="http://schemas.openxmlformats.org/officeDocument/2006/relationships" xmlns:p="http://schemas.openxmlformats.org/presentationml/2006/main" type="title" preserve="1">
   <p:cSld name="Title Slide">
@@ -332,7 +272,7 @@
           <a:p>
             <a:fld id="{2DC29746-1088-C241-BC8C-4CC03DF23E15}" type="datetimeFigureOut">
               <a:rPr lang="en-US" smtClean="0"/>
-              <a:t>4/17/2025</a:t>
+              <a:t>4/17/25</a:t>
             </a:fld>
             <a:endParaRPr lang="en-US"/>
           </a:p>
@@ -502,7 +442,7 @@
           <a:p>
             <a:fld id="{2DC29746-1088-C241-BC8C-4CC03DF23E15}" type="datetimeFigureOut">
               <a:rPr lang="en-US" smtClean="0"/>
-              <a:t>4/17/2025</a:t>
+              <a:t>4/17/25</a:t>
             </a:fld>
             <a:endParaRPr lang="en-US"/>
           </a:p>
@@ -682,7 +622,7 @@
           <a:p>
             <a:fld id="{2DC29746-1088-C241-BC8C-4CC03DF23E15}" type="datetimeFigureOut">
               <a:rPr lang="en-US" smtClean="0"/>
-              <a:t>4/17/2025</a:t>
+              <a:t>4/17/25</a:t>
             </a:fld>
             <a:endParaRPr lang="en-US"/>
           </a:p>
@@ -852,7 +792,7 @@
           <a:p>
             <a:fld id="{2DC29746-1088-C241-BC8C-4CC03DF23E15}" type="datetimeFigureOut">
               <a:rPr lang="en-US" smtClean="0"/>
-              <a:t>4/17/2025</a:t>
+              <a:t>4/17/25</a:t>
             </a:fld>
             <a:endParaRPr lang="en-US"/>
           </a:p>
@@ -1096,7 +1036,7 @@
           <a:p>
             <a:fld id="{2DC29746-1088-C241-BC8C-4CC03DF23E15}" type="datetimeFigureOut">
               <a:rPr lang="en-US" smtClean="0"/>
-              <a:t>4/17/2025</a:t>
+              <a:t>4/17/25</a:t>
             </a:fld>
             <a:endParaRPr lang="en-US"/>
           </a:p>
@@ -1328,7 +1268,7 @@
           <a:p>
             <a:fld id="{2DC29746-1088-C241-BC8C-4CC03DF23E15}" type="datetimeFigureOut">
               <a:rPr lang="en-US" smtClean="0"/>
-              <a:t>4/17/2025</a:t>
+              <a:t>4/17/25</a:t>
             </a:fld>
             <a:endParaRPr lang="en-US"/>
           </a:p>
@@ -1695,7 +1635,7 @@
           <a:p>
             <a:fld id="{2DC29746-1088-C241-BC8C-4CC03DF23E15}" type="datetimeFigureOut">
               <a:rPr lang="en-US" smtClean="0"/>
-              <a:t>4/17/2025</a:t>
+              <a:t>4/17/25</a:t>
             </a:fld>
             <a:endParaRPr lang="en-US"/>
           </a:p>
@@ -1813,7 +1753,7 @@
           <a:p>
             <a:fld id="{2DC29746-1088-C241-BC8C-4CC03DF23E15}" type="datetimeFigureOut">
               <a:rPr lang="en-US" smtClean="0"/>
-              <a:t>4/17/2025</a:t>
+              <a:t>4/17/25</a:t>
             </a:fld>
             <a:endParaRPr lang="en-US"/>
           </a:p>
@@ -1908,7 +1848,7 @@
           <a:p>
             <a:fld id="{2DC29746-1088-C241-BC8C-4CC03DF23E15}" type="datetimeFigureOut">
               <a:rPr lang="en-US" smtClean="0"/>
-              <a:t>4/17/2025</a:t>
+              <a:t>4/17/25</a:t>
             </a:fld>
             <a:endParaRPr lang="en-US"/>
           </a:p>
@@ -2185,7 +2125,7 @@
           <a:p>
             <a:fld id="{2DC29746-1088-C241-BC8C-4CC03DF23E15}" type="datetimeFigureOut">
               <a:rPr lang="en-US" smtClean="0"/>
-              <a:t>4/17/2025</a:t>
+              <a:t>4/17/25</a:t>
             </a:fld>
             <a:endParaRPr lang="en-US"/>
           </a:p>
@@ -2441,7 +2381,7 @@
           <a:p>
             <a:fld id="{2DC29746-1088-C241-BC8C-4CC03DF23E15}" type="datetimeFigureOut">
               <a:rPr lang="en-US" smtClean="0"/>
-              <a:t>4/17/2025</a:t>
+              <a:t>4/17/25</a:t>
             </a:fld>
             <a:endParaRPr lang="en-US"/>
           </a:p>
@@ -2654,7 +2594,7 @@
           <a:p>
             <a:fld id="{2DC29746-1088-C241-BC8C-4CC03DF23E15}" type="datetimeFigureOut">
               <a:rPr lang="en-US" smtClean="0"/>
-              <a:t>4/17/2025</a:t>
+              <a:t>4/17/25</a:t>
             </a:fld>
             <a:endParaRPr lang="en-US"/>
           </a:p>
@@ -3476,8 +3416,8 @@
         </p:nvSpPr>
         <p:spPr>
           <a:xfrm>
-            <a:off x="1191444" y="7322248"/>
-            <a:ext cx="13018379" cy="2554545"/>
+            <a:off x="1036276" y="6968545"/>
+            <a:ext cx="13018379" cy="2800767"/>
           </a:xfrm>
           <a:prstGeom prst="rect">
             <a:avLst/>
@@ -3495,7 +3435,7 @@
               <a:buChar char="•"/>
             </a:pPr>
             <a:r>
-              <a:rPr lang="en-US" sz="4000" dirty="0">
+              <a:rPr lang="en-US" sz="4400" dirty="0">
                 <a:latin typeface="Palatino" pitchFamily="2" charset="77"/>
                 <a:ea typeface="Palatino" pitchFamily="2" charset="77"/>
                 <a:cs typeface="Angsana New" panose="02020603050405020304" pitchFamily="18" charset="-34"/>
@@ -3509,7 +3449,7 @@
               <a:buChar char="•"/>
             </a:pPr>
             <a:r>
-              <a:rPr lang="en-US" sz="4000" dirty="0">
+              <a:rPr lang="en-US" sz="4400" dirty="0">
                 <a:latin typeface="Palatino" pitchFamily="2" charset="77"/>
                 <a:ea typeface="Palatino" pitchFamily="2" charset="77"/>
                 <a:cs typeface="Angsana New" panose="02020603050405020304" pitchFamily="18" charset="-34"/>
@@ -3533,8 +3473,8 @@
         </p:nvSpPr>
         <p:spPr>
           <a:xfrm>
-            <a:off x="15379522" y="25295454"/>
-            <a:ext cx="12584761" cy="6894195"/>
+            <a:off x="15379521" y="24899785"/>
+            <a:ext cx="12584761" cy="7032694"/>
           </a:xfrm>
           <a:prstGeom prst="rect">
             <a:avLst/>
@@ -3553,7 +3493,7 @@
               </a:lnSpc>
             </a:pPr>
             <a:r>
-              <a:rPr lang="en-US" sz="5400" dirty="0">
+              <a:rPr lang="en-US" sz="6000" dirty="0">
                 <a:latin typeface="Palatino" pitchFamily="2" charset="77"/>
                 <a:ea typeface="Palatino" pitchFamily="2" charset="77"/>
               </a:rPr>
@@ -3615,8 +3555,8 @@
         </p:nvSpPr>
         <p:spPr>
           <a:xfrm>
-            <a:off x="33120445" y="5629526"/>
-            <a:ext cx="5417418" cy="1107996"/>
+            <a:off x="33120444" y="5776619"/>
+            <a:ext cx="5417418" cy="1015663"/>
           </a:xfrm>
           <a:prstGeom prst="rect">
             <a:avLst/>
@@ -3629,8 +3569,9 @@
           </a:bodyPr>
           <a:lstStyle/>
           <a:p>
-            <a:r>
-              <a:rPr lang="en-US" sz="6600" dirty="0">
+            <a:pPr algn="ctr"/>
+            <a:r>
+              <a:rPr lang="en-US" sz="6000" dirty="0">
                 <a:latin typeface="Palatino" pitchFamily="2" charset="77"/>
                 <a:ea typeface="Palatino" pitchFamily="2" charset="77"/>
               </a:rPr>
@@ -3654,7 +3595,7 @@
         <p:spPr>
           <a:xfrm>
             <a:off x="16275527" y="5702447"/>
-            <a:ext cx="11255800" cy="1107996"/>
+            <a:ext cx="11255800" cy="1015663"/>
           </a:xfrm>
           <a:prstGeom prst="rect">
             <a:avLst/>
@@ -3669,7 +3610,7 @@
           <a:p>
             <a:pPr algn="ctr"/>
             <a:r>
-              <a:rPr lang="en-US" sz="6600" dirty="0">
+              <a:rPr lang="en-US" sz="6000" dirty="0">
                 <a:latin typeface="Palatino" pitchFamily="2" charset="77"/>
                 <a:ea typeface="Palatino" pitchFamily="2" charset="77"/>
               </a:rPr>
@@ -3692,7 +3633,7 @@
         </p:nvSpPr>
         <p:spPr>
           <a:xfrm>
-            <a:off x="1032768" y="11626544"/>
+            <a:off x="1032768" y="11440382"/>
             <a:ext cx="6159707" cy="4832092"/>
           </a:xfrm>
           <a:prstGeom prst="rect">
@@ -3757,7 +3698,7 @@
         <p:spPr>
           <a:xfrm>
             <a:off x="3277070" y="5703508"/>
-            <a:ext cx="7714969" cy="1107996"/>
+            <a:ext cx="7714969" cy="1015663"/>
           </a:xfrm>
           <a:prstGeom prst="rect">
             <a:avLst/>
@@ -3772,7 +3713,7 @@
           <a:p>
             <a:pPr algn="ctr"/>
             <a:r>
-              <a:rPr lang="en-US" sz="6600" dirty="0">
+              <a:rPr lang="en-US" sz="6000" dirty="0">
                 <a:latin typeface="Palatino" pitchFamily="2" charset="77"/>
                 <a:ea typeface="Palatino" pitchFamily="2" charset="77"/>
               </a:rPr>
@@ -3795,8 +3736,8 @@
         </p:nvSpPr>
         <p:spPr>
           <a:xfrm>
-            <a:off x="3510973" y="9887048"/>
-            <a:ext cx="7877927" cy="1107996"/>
+            <a:off x="3510973" y="9963248"/>
+            <a:ext cx="7877927" cy="1015663"/>
           </a:xfrm>
           <a:prstGeom prst="rect">
             <a:avLst/>
@@ -3810,7 +3751,7 @@
           <a:lstStyle/>
           <a:p>
             <a:r>
-              <a:rPr lang="en-US" sz="6600" dirty="0">
+              <a:rPr lang="en-US" sz="6000" dirty="0">
                 <a:latin typeface="Palatino" pitchFamily="2" charset="77"/>
                 <a:ea typeface="Palatino" pitchFamily="2" charset="77"/>
               </a:rPr>
@@ -3930,8 +3871,8 @@
         </p:nvSpPr>
         <p:spPr>
           <a:xfrm>
-            <a:off x="1032768" y="23779224"/>
-            <a:ext cx="6799566" cy="2800767"/>
+            <a:off x="1032768" y="23762289"/>
+            <a:ext cx="6799566" cy="8894743"/>
           </a:xfrm>
           <a:prstGeom prst="rect">
             <a:avLst/>
@@ -3965,35 +3906,26 @@
               <a:t>The module contains class handouts and worksheet keys</a:t>
             </a:r>
           </a:p>
-        </p:txBody>
-      </p:sp>
-      <p:sp>
-        <p:nvSpPr>
-          <p:cNvPr id="47" name="TextBox 46">
-            <a:extLst>
-              <a:ext uri="{FF2B5EF4-FFF2-40B4-BE49-F238E27FC236}">
-                <a16:creationId xmlns:a16="http://schemas.microsoft.com/office/drawing/2014/main" id="{F8354F15-8F13-E9E6-7177-CDD7D7AD7984}"/>
-              </a:ext>
-            </a:extLst>
-          </p:cNvPr>
-          <p:cNvSpPr txBox="1"/>
-          <p:nvPr/>
-        </p:nvSpPr>
-        <p:spPr>
-          <a:xfrm>
-            <a:off x="1191444" y="27414079"/>
-            <a:ext cx="6497055" cy="4154984"/>
-          </a:xfrm>
-          <a:prstGeom prst="rect">
-            <a:avLst/>
-          </a:prstGeom>
-          <a:noFill/>
-        </p:spPr>
-        <p:txBody>
-          <a:bodyPr wrap="square" rtlCol="0">
-            <a:spAutoFit/>
-          </a:bodyPr>
-          <a:lstStyle/>
+          <a:p>
+            <a:pPr marL="571500" indent="-571500">
+              <a:buFont typeface="Arial" panose="020B0604020202020204" pitchFamily="34" charset="0"/>
+              <a:buChar char="•"/>
+            </a:pPr>
+            <a:endParaRPr lang="en-US" sz="4400" dirty="0">
+              <a:latin typeface="Palatino" pitchFamily="2" charset="77"/>
+              <a:ea typeface="Palatino" pitchFamily="2" charset="77"/>
+            </a:endParaRPr>
+          </a:p>
+          <a:p>
+            <a:pPr marL="571500" indent="-571500">
+              <a:buFont typeface="Arial" panose="020B0604020202020204" pitchFamily="34" charset="0"/>
+              <a:buChar char="•"/>
+            </a:pPr>
+            <a:endParaRPr lang="en-US" sz="4400" dirty="0">
+              <a:latin typeface="Palatino" pitchFamily="2" charset="77"/>
+              <a:ea typeface="Palatino" pitchFamily="2" charset="77"/>
+            </a:endParaRPr>
+          </a:p>
           <a:p>
             <a:r>
               <a:rPr lang="en-US" sz="4400" dirty="0">
@@ -4015,6 +3947,12 @@
               </a:rPr>
               <a:t>Summarize the takeaways and learning objectives from the sports application handouts</a:t>
             </a:r>
+          </a:p>
+          <a:p>
+            <a:endParaRPr lang="en-US" sz="4400" dirty="0">
+              <a:latin typeface="Palatino" pitchFamily="2" charset="77"/>
+              <a:ea typeface="Palatino" pitchFamily="2" charset="77"/>
+            </a:endParaRPr>
           </a:p>
         </p:txBody>
       </p:sp>
@@ -4032,7 +3970,7 @@
         </p:nvSpPr>
         <p:spPr>
           <a:xfrm>
-            <a:off x="17768824" y="14109953"/>
+            <a:off x="17768824" y="13921973"/>
             <a:ext cx="8070470" cy="1015663"/>
           </a:xfrm>
           <a:prstGeom prst="rect">
@@ -4118,8 +4056,8 @@
         </p:nvSpPr>
         <p:spPr>
           <a:xfrm>
-            <a:off x="17810447" y="13417088"/>
-            <a:ext cx="8070470" cy="646331"/>
+            <a:off x="15641054" y="13417088"/>
+            <a:ext cx="12448672" cy="369332"/>
           </a:xfrm>
           <a:prstGeom prst="rect">
             <a:avLst/>
@@ -4291,8 +4229,8 @@
         </p:nvSpPr>
         <p:spPr>
           <a:xfrm>
-            <a:off x="15379522" y="14975548"/>
-            <a:ext cx="12584761" cy="4154984"/>
+            <a:off x="15379522" y="15024128"/>
+            <a:ext cx="12584761" cy="2800767"/>
           </a:xfrm>
           <a:prstGeom prst="rect">
             <a:avLst/>
@@ -4329,25 +4267,11 @@
                 <a:ea typeface="Palatino" pitchFamily="2" charset="77"/>
                 <a:cs typeface="Angsana New" panose="02020603050405020304" pitchFamily="18" charset="-34"/>
               </a:rPr>
-              <a:t>Known for elite scoring, deep threes, and playmaking</a:t>
+              <a:t>NCAA’s all-time leading scorer</a:t>
             </a:r>
           </a:p>
           <a:p>
             <a:pPr marL="685800" indent="-685800">
-              <a:buFont typeface="Arial" panose="020B0604020202020204" pitchFamily="34" charset="0"/>
-              <a:buChar char="•"/>
-            </a:pPr>
-            <a:r>
-              <a:rPr lang="en-US" sz="4400" dirty="0">
-                <a:latin typeface="Palatino" pitchFamily="2" charset="77"/>
-                <a:ea typeface="Palatino" pitchFamily="2" charset="77"/>
-                <a:cs typeface="Angsana New" panose="02020603050405020304" pitchFamily="18" charset="-34"/>
-              </a:rPr>
-              <a:t>NCAA’s all-time leading scorer</a:t>
-            </a:r>
-          </a:p>
-          <a:p>
-            <a:pPr marL="571500" indent="-571500">
               <a:buFont typeface="Arial" panose="020B0604020202020204" pitchFamily="34" charset="0"/>
               <a:buChar char="•"/>
             </a:pPr>
@@ -4483,7 +4407,7 @@
         <p:spPr>
           <a:xfrm>
             <a:off x="31243647" y="15024128"/>
-            <a:ext cx="9171012" cy="1107996"/>
+            <a:ext cx="9171012" cy="1015663"/>
           </a:xfrm>
           <a:prstGeom prst="rect">
             <a:avLst/>
@@ -4498,7 +4422,7 @@
           <a:p>
             <a:pPr algn="ctr"/>
             <a:r>
-              <a:rPr lang="en-US" sz="6600" dirty="0">
+              <a:rPr lang="en-US" sz="6000" dirty="0">
                 <a:latin typeface="Palatino" pitchFamily="2" charset="77"/>
                 <a:ea typeface="Palatino" pitchFamily="2" charset="77"/>
               </a:rPr>
@@ -4521,7 +4445,7 @@
         </p:nvSpPr>
         <p:spPr>
           <a:xfrm>
-            <a:off x="29792568" y="25770697"/>
+            <a:off x="29792568" y="25749486"/>
             <a:ext cx="10785015" cy="5509200"/>
           </a:xfrm>
           <a:prstGeom prst="rect">
@@ -4602,7 +4526,7 @@
         </p:nvSpPr>
         <p:spPr>
           <a:xfrm>
-            <a:off x="30860097" y="16405021"/>
+            <a:off x="30860096" y="16459200"/>
             <a:ext cx="9938113" cy="2123658"/>
           </a:xfrm>
           <a:prstGeom prst="rect">
@@ -4631,36 +4555,6 @@
           </a:p>
         </p:txBody>
       </p:sp>
-      <p:pic>
-        <p:nvPicPr>
-          <p:cNvPr id="6" name="Picture 5">
-            <a:extLst>
-              <a:ext uri="{FF2B5EF4-FFF2-40B4-BE49-F238E27FC236}">
-                <a16:creationId xmlns:a16="http://schemas.microsoft.com/office/drawing/2014/main" id="{2595CA20-E317-48C5-6F76-31CC5411B6AF}"/>
-              </a:ext>
-            </a:extLst>
-          </p:cNvPr>
-          <p:cNvPicPr>
-            <a:picLocks noChangeAspect="1"/>
-          </p:cNvPicPr>
-          <p:nvPr/>
-        </p:nvPicPr>
-        <p:blipFill>
-          <a:blip r:embed="rId8"/>
-          <a:stretch>
-            <a:fillRect/>
-          </a:stretch>
-        </p:blipFill>
-        <p:spPr>
-          <a:xfrm>
-            <a:off x="16629715" y="19206356"/>
-            <a:ext cx="10084374" cy="6423950"/>
-          </a:xfrm>
-          <a:prstGeom prst="rect">
-            <a:avLst/>
-          </a:prstGeom>
-        </p:spPr>
-      </p:pic>
       <p:pic>
         <p:nvPicPr>
           <p:cNvPr id="7" name="Picture 6">
@@ -4676,7 +4570,7 @@
           <p:nvPr/>
         </p:nvPicPr>
         <p:blipFill>
-          <a:blip r:embed="rId9"/>
+          <a:blip r:embed="rId8"/>
           <a:stretch>
             <a:fillRect/>
           </a:stretch>
@@ -4764,6 +4658,36 @@
           <p:nvPr/>
         </p:nvPicPr>
         <p:blipFill>
+          <a:blip r:embed="rId9"/>
+          <a:stretch>
+            <a:fillRect/>
+          </a:stretch>
+        </p:blipFill>
+        <p:spPr>
+          <a:xfrm>
+            <a:off x="32760482" y="1401990"/>
+            <a:ext cx="2387600" cy="2489200"/>
+          </a:xfrm>
+          <a:prstGeom prst="rect">
+            <a:avLst/>
+          </a:prstGeom>
+        </p:spPr>
+      </p:pic>
+      <p:pic>
+        <p:nvPicPr>
+          <p:cNvPr id="4" name="Picture 3">
+            <a:extLst>
+              <a:ext uri="{FF2B5EF4-FFF2-40B4-BE49-F238E27FC236}">
+                <a16:creationId xmlns:a16="http://schemas.microsoft.com/office/drawing/2014/main" id="{1D0EBF2F-1AC5-6F1A-553C-1B939D2DD808}"/>
+              </a:ext>
+            </a:extLst>
+          </p:cNvPr>
+          <p:cNvPicPr>
+            <a:picLocks noChangeAspect="1"/>
+          </p:cNvPicPr>
+          <p:nvPr/>
+        </p:nvPicPr>
+        <p:blipFill>
           <a:blip r:embed="rId10"/>
           <a:stretch>
             <a:fillRect/>
@@ -4771,8 +4695,8 @@
         </p:blipFill>
         <p:spPr>
           <a:xfrm>
-            <a:off x="32760482" y="1401990"/>
-            <a:ext cx="2387600" cy="2489200"/>
+            <a:off x="17163716" y="17955405"/>
+            <a:ext cx="9563768" cy="7224202"/>
           </a:xfrm>
           <a:prstGeom prst="rect">
             <a:avLst/>

</xml_diff>